<commit_message>
Time Delay Tutorial Renewal
- 3D UI Settings

- Implement pause and resume by
  time.timescale

- Change game object color at
  regular intervals via coroutine
  function
</commit_message>
<xml_diff>
--- a/Assets/Class/Animation Clip/PPT Data/Animation Clip Example.pptx
+++ b/Assets/Class/Animation Clip/PPT Data/Animation Clip Example.pptx
@@ -2,28 +2,28 @@
 <file path=ppt/presentation.xml><?xml version="1.0" encoding="utf-8"?>
 <p:presentation xmlns:a="http://schemas.openxmlformats.org/drawingml/2006/main" xmlns:r="http://schemas.openxmlformats.org/officeDocument/2006/relationships" xmlns:p="http://schemas.openxmlformats.org/presentationml/2006/main" xmlns:p14="http://schemas.microsoft.com/office/powerpoint/2010/main" saveSubsetFonts="1" firstSlideNum="0">
   <p:sldMasterIdLst>
-    <p:sldMasterId id="2147486957" r:id="rId12"/>
+    <p:sldMasterId id="2147486959" r:id="rId12"/>
   </p:sldMasterIdLst>
   <p:notesMasterIdLst>
     <p:notesMasterId r:id="rId14"/>
   </p:notesMasterIdLst>
   <p:sldIdLst>
     <p:sldId id="315" r:id="rId16"/>
-    <p:sldId id="327" r:id="rId17"/>
-    <p:sldId id="331" r:id="rId18"/>
-    <p:sldId id="319" r:id="rId19"/>
-    <p:sldId id="321" r:id="rId20"/>
-    <p:sldId id="333" r:id="rId21"/>
-    <p:sldId id="334" r:id="rId22"/>
-    <p:sldId id="335" r:id="rId23"/>
-    <p:sldId id="322" r:id="rId24"/>
-    <p:sldId id="323" r:id="rId25"/>
-    <p:sldId id="324" r:id="rId26"/>
-    <p:sldId id="332" r:id="rId27"/>
-    <p:sldId id="326" r:id="rId28"/>
-    <p:sldId id="328" r:id="rId29"/>
-    <p:sldId id="329" r:id="rId30"/>
-    <p:sldId id="330" r:id="rId31"/>
+    <p:sldId id="327" r:id="rId18"/>
+    <p:sldId id="331" r:id="rId19"/>
+    <p:sldId id="319" r:id="rId21"/>
+    <p:sldId id="321" r:id="rId23"/>
+    <p:sldId id="333" r:id="rId25"/>
+    <p:sldId id="334" r:id="rId27"/>
+    <p:sldId id="335" r:id="rId29"/>
+    <p:sldId id="322" r:id="rId31"/>
+    <p:sldId id="323" r:id="rId33"/>
+    <p:sldId id="324" r:id="rId35"/>
+    <p:sldId id="332" r:id="rId37"/>
+    <p:sldId id="326" r:id="rId39"/>
+    <p:sldId id="328" r:id="rId41"/>
+    <p:sldId id="329" r:id="rId43"/>
+    <p:sldId id="330" r:id="rId45"/>
   </p:sldIdLst>
   <p:sldSz cx="12192000" cy="6858000"/>
   <p:notesSz cx="6858000" cy="9144000"/>
@@ -11425,7 +11425,7 @@
       </p:sp>
       <p:pic>
         <p:nvPicPr>
-          <p:cNvPr id="40" name="Picture " descr="C:/Users/Admin1/AppData/Roaming/PolarisOffice/ETemp/4076_20445776/fImage424692249169.png"/>
+          <p:cNvPr id="40" name="Picture "/>
           <p:cNvPicPr>
             <a:picLocks noChangeAspect="1"/>
           </p:cNvPicPr>
@@ -11574,7 +11574,7 @@
       </p:sp>
       <p:pic>
         <p:nvPicPr>
-          <p:cNvPr id="46" name="그림 24" descr="C:/Users/Admin1/AppData/Roaming/PolarisOffice/ETemp/4076_20445776/fImage416422281478.png"/>
+          <p:cNvPr id="46" name="그림 24"/>
           <p:cNvPicPr>
             <a:picLocks noChangeAspect="1"/>
           </p:cNvPicPr>

</xml_diff>